<commit_message>
ajout des infos et les dates
</commit_message>
<xml_diff>
--- a/media/generated_ppts/DR IAM_Agadir NOMATIS.pptx
+++ b/media/generated_ppts/DR IAM_Agadir NOMATIS.pptx
@@ -3091,6 +3091,49 @@
       <p:grpSpPr/>
       <p:sp>
         <p:nvSpPr>
+          <p:cNvPr id="4" name="Rectangle 3"/>
+          <p:cNvSpPr/>
+          <p:nvPr/>
+        </p:nvSpPr>
+        <p:spPr>
+          <a:xfrm>
+            <a:off x="792000" y="792000"/>
+            <a:ext cx="7632000" cy="5328000"/>
+          </a:xfrm>
+          <a:prstGeom prst="rect">
+            <a:avLst/>
+          </a:prstGeom>
+          <a:noFill/>
+          <a:ln w="38100">
+            <a:solidFill>
+              <a:srgbClr val="000000"/>
+            </a:solidFill>
+          </a:ln>
+        </p:spPr>
+        <p:style>
+          <a:lnRef idx="1">
+            <a:schemeClr val="accent1"/>
+          </a:lnRef>
+          <a:fillRef idx="3">
+            <a:schemeClr val="accent1"/>
+          </a:fillRef>
+          <a:effectRef idx="2">
+            <a:schemeClr val="accent1"/>
+          </a:effectRef>
+          <a:fontRef idx="minor">
+            <a:schemeClr val="lt1"/>
+          </a:fontRef>
+        </p:style>
+        <p:txBody>
+          <a:bodyPr rtlCol="0" anchor="ctr"/>
+          <a:lstStyle/>
+          <a:p>
+            <a:pPr algn="ctr"/>
+          </a:p>
+        </p:txBody>
+      </p:sp>
+      <p:sp>
+        <p:nvSpPr>
           <p:cNvPr id="2" name="Title 1"/>
           <p:cNvSpPr>
             <a:spLocks noGrp="1"/>
@@ -3105,7 +3148,10 @@
           <a:lstStyle/>
           <a:p>
             <a:pPr>
-              <a:defRPr sz="3200">
+              <a:defRPr sz="3200" b="1">
+                <a:solidFill>
+                  <a:srgbClr val="000000"/>
+                </a:solidFill>
                 <a:latin typeface="Arial Narrow"/>
               </a:defRPr>
             </a:pPr>
@@ -3132,6 +3178,9 @@
           <a:p>
             <a:pPr>
               <a:defRPr sz="1800">
+                <a:solidFill>
+                  <a:srgbClr val="404040"/>
+                </a:solidFill>
                 <a:latin typeface="Arial Narrow"/>
               </a:defRPr>
             </a:pPr>
@@ -3161,7 +3210,7 @@
       <p:grpSpPr/>
       <p:pic>
         <p:nvPicPr>
-          <p:cNvPr id="2" name="Picture 1" descr="AA.jpeg"/>
+          <p:cNvPr id="2" name="Picture 1" descr="AAA.jpeg"/>
           <p:cNvPicPr>
             <a:picLocks noChangeAspect="1"/>
           </p:cNvPicPr>
@@ -3176,7 +3225,7 @@
         <p:spPr>
           <a:xfrm>
             <a:off x="360000" y="180000"/>
-            <a:ext cx="9360000" cy="2520000"/>
+            <a:ext cx="8820000" cy="2520000"/>
           </a:xfrm>
           <a:prstGeom prst="rect">
             <a:avLst/>

</xml_diff>